<commit_message>
Added icons to End solution, moved assets out of streaming to not convey antipattern
</commit_message>
<xml_diff>
--- a/UnityLightUp.pptx
+++ b/UnityLightUp.pptx
@@ -22992,11 +22992,7 @@
           <a:p>
             <a:r>
               <a:rPr lang="en-US" dirty="0"/>
-              <a:t>Plugins (1/2):  </a:t>
-            </a:r>
-            <a:r>
-              <a:rPr lang="en-US"/>
-              <a:t>Folders Names</a:t>
+              <a:t>Plugins (1/2):  Folders Names</a:t>
             </a:r>
             <a:endParaRPr lang="en-US" sz="2400" dirty="0"/>
           </a:p>

</xml_diff>